<commit_message>
16216 updates--9/25 lec, P4
</commit_message>
<xml_diff>
--- a/16216/f15/lectures/16.216f15_lec9_while.pptx
+++ b/16216/f15/lectures/16.216f15_lec9_while.pptx
@@ -522,7 +522,7 @@
         <p:nvSpPr>
           <p:cNvPr id="20484" name="Rectangle 4"/>
           <p:cNvSpPr>
-            <a:spLocks noRot="1" noChangeArrowheads="1" noTextEdit="1"/>
+            <a:spLocks noGrp="1" noRot="1" noChangeAspect="1" noChangeArrowheads="1" noTextEdit="1"/>
           </p:cNvSpPr>
           <p:nvPr>
             <p:ph type="sldImg" idx="2"/>
@@ -546,7 +546,7 @@
             <a:tailEnd/>
           </a:ln>
           <a:extLst>
-            <a:ext uri="{909E8E84-426E-40dd-AFC4-6F175D3DCCD1}">
+            <a:ext uri="{909E8E84-426E-40DD-AFC4-6F175D3DCCD1}">
               <a14:hiddenFill xmlns:a14="http://schemas.microsoft.com/office/drawing/2010/main">
                 <a:solidFill>
                   <a:srgbClr val="FFFFFF"/>
@@ -554,7 +554,7 @@
               </a14:hiddenFill>
             </a:ext>
             <a:ext uri="{FAA26D3D-D897-4be2-8F04-BA451C77F1D7}">
-              <ma14:placeholderFlag xmlns:ma14="http://schemas.microsoft.com/office/mac/drawingml/2011/main" val="1"/>
+              <ma14:placeholderFlag xmlns:ma14="http://schemas.microsoft.com/office/mac/drawingml/2011/main" xmlns="" val="1"/>
             </a:ext>
           </a:extLst>
         </p:spPr>
@@ -892,14 +892,14 @@
           <a:noFill/>
           <a:ln/>
           <a:extLst>
-            <a:ext uri="{909E8E84-426E-40dd-AFC4-6F175D3DCCD1}">
+            <a:ext uri="{909E8E84-426E-40DD-AFC4-6F175D3DCCD1}">
               <a14:hiddenFill xmlns:a14="http://schemas.microsoft.com/office/drawing/2010/main">
                 <a:solidFill>
                   <a:srgbClr val="FFFFFF"/>
                 </a:solidFill>
               </a14:hiddenFill>
             </a:ext>
-            <a:ext uri="{91240B29-F687-4f45-9708-019B960494DF}">
+            <a:ext uri="{91240B29-F687-4F45-9708-019B960494DF}">
               <a14:hiddenLine xmlns:a14="http://schemas.microsoft.com/office/drawing/2010/main" w="9525">
                 <a:solidFill>
                   <a:srgbClr val="000000"/>
@@ -1043,7 +1043,7 @@
         <p:nvSpPr>
           <p:cNvPr id="21507" name="Rectangle 2"/>
           <p:cNvSpPr>
-            <a:spLocks noRot="1" noChangeArrowheads="1" noTextEdit="1"/>
+            <a:spLocks noGrp="1" noRot="1" noChangeAspect="1" noChangeArrowheads="1" noTextEdit="1"/>
           </p:cNvSpPr>
           <p:nvPr>
             <p:ph type="sldImg"/>
@@ -1067,14 +1067,14 @@
           <a:noFill/>
           <a:ln/>
           <a:extLst>
-            <a:ext uri="{909E8E84-426E-40dd-AFC4-6F175D3DCCD1}">
+            <a:ext uri="{909E8E84-426E-40DD-AFC4-6F175D3DCCD1}">
               <a14:hiddenFill xmlns:a14="http://schemas.microsoft.com/office/drawing/2010/main">
                 <a:solidFill>
                   <a:srgbClr val="FFFFFF"/>
                 </a:solidFill>
               </a14:hiddenFill>
             </a:ext>
-            <a:ext uri="{91240B29-F687-4f45-9708-019B960494DF}">
+            <a:ext uri="{91240B29-F687-4F45-9708-019B960494DF}">
               <a14:hiddenLine xmlns:a14="http://schemas.microsoft.com/office/drawing/2010/main" w="9525">
                 <a:solidFill>
                   <a:srgbClr val="000000"/>
@@ -1085,7 +1085,7 @@
               </a14:hiddenLine>
             </a:ext>
             <a:ext uri="{FAA26D3D-D897-4be2-8F04-BA451C77F1D7}">
-              <ma14:placeholderFlag xmlns:ma14="http://schemas.microsoft.com/office/mac/drawingml/2011/main" val="1"/>
+              <ma14:placeholderFlag xmlns:ma14="http://schemas.microsoft.com/office/mac/drawingml/2011/main" xmlns="" val="1"/>
             </a:ext>
           </a:extLst>
         </p:spPr>
@@ -1187,7 +1187,7 @@
             <a:tailEnd/>
           </a:ln>
           <a:extLst>
-            <a:ext uri="{909E8E84-426E-40dd-AFC4-6F175D3DCCD1}">
+            <a:ext uri="{909E8E84-426E-40DD-AFC4-6F175D3DCCD1}">
               <a14:hiddenFill xmlns:a14="http://schemas.microsoft.com/office/drawing/2010/main">
                 <a:solidFill>
                   <a:srgbClr val="FFFFFF"/>
@@ -1230,7 +1230,7 @@
             <a:tailEnd/>
           </a:ln>
           <a:extLst>
-            <a:ext uri="{909E8E84-426E-40dd-AFC4-6F175D3DCCD1}">
+            <a:ext uri="{909E8E84-426E-40DD-AFC4-6F175D3DCCD1}">
               <a14:hiddenFill xmlns:a14="http://schemas.microsoft.com/office/drawing/2010/main">
                 <a:noFill/>
               </a14:hiddenFill>
@@ -1331,7 +1331,7 @@
             <a:fld id="{D5B52DAA-E548-2142-9E12-7968E5C29A90}" type="datetime1">
               <a:rPr lang="en-US"/>
               <a:pPr/>
-              <a:t>9/21/15</a:t>
+              <a:t>9/23/2015</a:t>
             </a:fld>
             <a:endParaRPr lang="en-US"/>
           </a:p>
@@ -1528,7 +1528,7 @@
             <a:fld id="{E6FCC762-6072-5A41-AB5E-39993CE97C15}" type="datetime1">
               <a:rPr lang="en-US"/>
               <a:pPr/>
-              <a:t>9/21/15</a:t>
+              <a:t>9/23/2015</a:t>
             </a:fld>
             <a:endParaRPr lang="en-US"/>
           </a:p>
@@ -1734,7 +1734,7 @@
             <a:fld id="{30836E7A-5D8B-9E4E-B8E0-AE1338307F98}" type="datetime1">
               <a:rPr lang="en-US"/>
               <a:pPr/>
-              <a:t>9/21/15</a:t>
+              <a:t>9/23/2015</a:t>
             </a:fld>
             <a:endParaRPr lang="en-US"/>
           </a:p>
@@ -1997,7 +1997,7 @@
             <a:fld id="{7DCDB829-7BAE-1F42-9832-232A1B5EA6C6}" type="datetime1">
               <a:rPr lang="en-US"/>
               <a:pPr/>
-              <a:t>9/21/15</a:t>
+              <a:t>9/23/2015</a:t>
             </a:fld>
             <a:endParaRPr lang="en-US"/>
           </a:p>
@@ -2260,7 +2260,7 @@
             <a:fld id="{91E4D59D-CD73-DA43-8D13-EDBB774FD317}" type="datetime1">
               <a:rPr lang="en-US"/>
               <a:pPr/>
-              <a:t>9/21/15</a:t>
+              <a:t>9/23/2015</a:t>
             </a:fld>
             <a:endParaRPr lang="en-US"/>
           </a:p>
@@ -2456,7 +2456,7 @@
             <a:fld id="{E91F9C86-9753-CE46-BC7B-3D49B2815135}" type="datetime1">
               <a:rPr lang="en-US"/>
               <a:pPr/>
-              <a:t>9/21/15</a:t>
+              <a:t>9/23/2015</a:t>
             </a:fld>
             <a:endParaRPr lang="en-US"/>
           </a:p>
@@ -2674,7 +2674,7 @@
             <a:fld id="{DF3EA3AE-4E03-9E4D-8CD6-35E65A03146E}" type="datetime1">
               <a:rPr lang="en-US"/>
               <a:pPr/>
-              <a:t>9/21/15</a:t>
+              <a:t>9/23/2015</a:t>
             </a:fld>
             <a:endParaRPr lang="en-US"/>
           </a:p>
@@ -2988,7 +2988,7 @@
             <a:fld id="{4351918F-6901-024A-9793-FBFB7146CA1A}" type="datetime1">
               <a:rPr lang="en-US"/>
               <a:pPr/>
-              <a:t>9/21/15</a:t>
+              <a:t>9/23/2015</a:t>
             </a:fld>
             <a:endParaRPr lang="en-US"/>
           </a:p>
@@ -3441,7 +3441,7 @@
             <a:fld id="{3BC190C1-9B69-074B-B060-A6B2980EB529}" type="datetime1">
               <a:rPr lang="en-US"/>
               <a:pPr/>
-              <a:t>9/21/15</a:t>
+              <a:t>9/23/2015</a:t>
             </a:fld>
             <a:endParaRPr lang="en-US"/>
           </a:p>
@@ -3585,7 +3585,7 @@
             <a:fld id="{1A2192DA-BF0F-CE49-BBF5-B9E7A3508E76}" type="datetime1">
               <a:rPr lang="en-US"/>
               <a:pPr/>
-              <a:t>9/21/15</a:t>
+              <a:t>9/23/2015</a:t>
             </a:fld>
             <a:endParaRPr lang="en-US"/>
           </a:p>
@@ -3706,7 +3706,7 @@
             <a:fld id="{143AC22D-090F-2B4B-8390-65FC80DBBC67}" type="datetime1">
               <a:rPr lang="en-US"/>
               <a:pPr/>
-              <a:t>9/21/15</a:t>
+              <a:t>9/23/2015</a:t>
             </a:fld>
             <a:endParaRPr lang="en-US"/>
           </a:p>
@@ -4009,7 +4009,7 @@
             <a:fld id="{B3140346-F2A1-5A44-91C8-122CFC3297A8}" type="datetime1">
               <a:rPr lang="en-US"/>
               <a:pPr/>
-              <a:t>9/21/15</a:t>
+              <a:t>9/23/2015</a:t>
             </a:fld>
             <a:endParaRPr lang="en-US"/>
           </a:p>
@@ -4289,7 +4289,7 @@
             <a:fld id="{00D55E8A-D2C7-ED49-A947-576058BA20D0}" type="datetime1">
               <a:rPr lang="en-US"/>
               <a:pPr/>
-              <a:t>9/21/15</a:t>
+              <a:t>9/23/2015</a:t>
             </a:fld>
             <a:endParaRPr lang="en-US"/>
           </a:p>
@@ -4417,14 +4417,14 @@
             <a:noFill/>
           </a:ln>
           <a:extLst>
-            <a:ext uri="{909E8E84-426E-40dd-AFC4-6F175D3DCCD1}">
+            <a:ext uri="{909E8E84-426E-40DD-AFC4-6F175D3DCCD1}">
               <a14:hiddenFill xmlns:a14="http://schemas.microsoft.com/office/drawing/2010/main">
                 <a:solidFill>
                   <a:srgbClr val="FFFFFF"/>
                 </a:solidFill>
               </a14:hiddenFill>
             </a:ext>
-            <a:ext uri="{91240B29-F687-4f45-9708-019B960494DF}">
+            <a:ext uri="{91240B29-F687-4F45-9708-019B960494DF}">
               <a14:hiddenLine xmlns:a14="http://schemas.microsoft.com/office/drawing/2010/main" w="9525">
                 <a:solidFill>
                   <a:srgbClr val="000000"/>
@@ -4435,7 +4435,7 @@
               </a14:hiddenLine>
             </a:ext>
             <a:ext uri="{FAA26D3D-D897-4be2-8F04-BA451C77F1D7}">
-              <ma14:placeholderFlag xmlns:ma14="http://schemas.microsoft.com/office/mac/drawingml/2011/main" val="1"/>
+              <ma14:placeholderFlag xmlns:ma14="http://schemas.microsoft.com/office/mac/drawingml/2011/main" xmlns="" val="1"/>
             </a:ext>
           </a:extLst>
         </p:spPr>
@@ -4478,14 +4478,14 @@
             <a:noFill/>
           </a:ln>
           <a:extLst>
-            <a:ext uri="{909E8E84-426E-40dd-AFC4-6F175D3DCCD1}">
+            <a:ext uri="{909E8E84-426E-40DD-AFC4-6F175D3DCCD1}">
               <a14:hiddenFill xmlns:a14="http://schemas.microsoft.com/office/drawing/2010/main">
                 <a:solidFill>
                   <a:srgbClr val="FFFFFF"/>
                 </a:solidFill>
               </a14:hiddenFill>
             </a:ext>
-            <a:ext uri="{91240B29-F687-4f45-9708-019B960494DF}">
+            <a:ext uri="{91240B29-F687-4F45-9708-019B960494DF}">
               <a14:hiddenLine xmlns:a14="http://schemas.microsoft.com/office/drawing/2010/main" w="9525">
                 <a:solidFill>
                   <a:srgbClr val="000000"/>
@@ -4496,7 +4496,7 @@
               </a14:hiddenLine>
             </a:ext>
             <a:ext uri="{FAA26D3D-D897-4be2-8F04-BA451C77F1D7}">
-              <ma14:placeholderFlag xmlns:ma14="http://schemas.microsoft.com/office/mac/drawingml/2011/main" val="1"/>
+              <ma14:placeholderFlag xmlns:ma14="http://schemas.microsoft.com/office/mac/drawingml/2011/main" xmlns="" val="1"/>
             </a:ext>
           </a:extLst>
         </p:spPr>
@@ -4588,7 +4588,7 @@
             <a:fld id="{8FB2302D-1983-3E4B-9B62-C248F68D3BA8}" type="datetime1">
               <a:rPr lang="en-US"/>
               <a:pPr/>
-              <a:t>9/21/15</a:t>
+              <a:t>9/23/2015</a:t>
             </a:fld>
             <a:endParaRPr lang="en-US"/>
           </a:p>
@@ -4761,7 +4761,7 @@
             <a:tailEnd/>
           </a:ln>
           <a:extLst>
-            <a:ext uri="{909E8E84-426E-40dd-AFC4-6F175D3DCCD1}">
+            <a:ext uri="{909E8E84-426E-40DD-AFC4-6F175D3DCCD1}">
               <a14:hiddenFill xmlns:a14="http://schemas.microsoft.com/office/drawing/2010/main">
                 <a:solidFill>
                   <a:srgbClr val="FFFFFF"/>
@@ -4804,7 +4804,7 @@
             <a:tailEnd/>
           </a:ln>
           <a:extLst>
-            <a:ext uri="{909E8E84-426E-40dd-AFC4-6F175D3DCCD1}">
+            <a:ext uri="{909E8E84-426E-40DD-AFC4-6F175D3DCCD1}">
               <a14:hiddenFill xmlns:a14="http://schemas.microsoft.com/office/drawing/2010/main">
                 <a:noFill/>
               </a14:hiddenFill>
@@ -4840,7 +4840,7 @@
   <p:timing>
     <p:tnLst>
       <p:par>
-        <p:cTn xmlns:p14="http://schemas.microsoft.com/office/powerpoint/2010/main" id="1" dur="indefinite" restart="never" nodeType="tmRoot"/>
+        <p:cTn id="1" dur="indefinite" restart="never" nodeType="tmRoot"/>
       </p:par>
     </p:tnLst>
   </p:timing>
@@ -5502,7 +5502,7 @@
   <p:timing>
     <p:tnLst>
       <p:par>
-        <p:cTn xmlns:p14="http://schemas.microsoft.com/office/powerpoint/2010/main" id="1" dur="indefinite" restart="never" nodeType="tmRoot"/>
+        <p:cTn id="1" dur="indefinite" restart="never" nodeType="tmRoot"/>
       </p:par>
     </p:tnLst>
   </p:timing>
@@ -5953,14 +5953,14 @@
           <a:noFill/>
           <a:ln/>
           <a:extLst>
-            <a:ext uri="{909E8E84-426E-40dd-AFC4-6F175D3DCCD1}">
+            <a:ext uri="{909E8E84-426E-40DD-AFC4-6F175D3DCCD1}">
               <a14:hiddenFill xmlns:a14="http://schemas.microsoft.com/office/drawing/2010/main">
                 <a:solidFill>
                   <a:srgbClr val="FFFFFF"/>
                 </a:solidFill>
               </a14:hiddenFill>
             </a:ext>
-            <a:ext uri="{91240B29-F687-4f45-9708-019B960494DF}">
+            <a:ext uri="{91240B29-F687-4F45-9708-019B960494DF}">
               <a14:hiddenLine xmlns:a14="http://schemas.microsoft.com/office/drawing/2010/main" w="9525">
                 <a:solidFill>
                   <a:srgbClr val="000000"/>
@@ -6068,7 +6068,7 @@
                 <a:latin typeface="Garamond" charset="0"/>
               </a:rPr>
               <a:pPr/>
-              <a:t>9/21/15</a:t>
+              <a:t>9/23/2015</a:t>
             </a:fld>
             <a:endParaRPr lang="en-US" sz="1200">
               <a:latin typeface="Garamond" charset="0"/>
@@ -6115,14 +6115,14 @@
           <a:noFill/>
           <a:ln/>
           <a:extLst>
-            <a:ext uri="{909E8E84-426E-40dd-AFC4-6F175D3DCCD1}">
+            <a:ext uri="{909E8E84-426E-40DD-AFC4-6F175D3DCCD1}">
               <a14:hiddenFill xmlns:a14="http://schemas.microsoft.com/office/drawing/2010/main">
                 <a:solidFill>
                   <a:srgbClr val="FFFFFF"/>
                 </a:solidFill>
               </a14:hiddenFill>
             </a:ext>
-            <a:ext uri="{91240B29-F687-4f45-9708-019B960494DF}">
+            <a:ext uri="{91240B29-F687-4F45-9708-019B960494DF}">
               <a14:hiddenLine xmlns:a14="http://schemas.microsoft.com/office/drawing/2010/main" w="9525">
                 <a:solidFill>
                   <a:srgbClr val="000000"/>
@@ -6246,7 +6246,7 @@
   <p:timing>
     <p:tnLst>
       <p:par>
-        <p:cTn xmlns:p14="http://schemas.microsoft.com/office/powerpoint/2010/main" id="1" dur="indefinite" restart="never" nodeType="tmRoot"/>
+        <p:cTn id="1" dur="indefinite" restart="never" nodeType="tmRoot"/>
       </p:par>
     </p:tnLst>
   </p:timing>
@@ -6483,14 +6483,14 @@
           <a:noFill/>
           <a:ln/>
           <a:extLst>
-            <a:ext uri="{909E8E84-426E-40dd-AFC4-6F175D3DCCD1}">
+            <a:ext uri="{909E8E84-426E-40DD-AFC4-6F175D3DCCD1}">
               <a14:hiddenFill xmlns:a14="http://schemas.microsoft.com/office/drawing/2010/main">
                 <a:solidFill>
                   <a:srgbClr val="FFFFFF"/>
                 </a:solidFill>
               </a14:hiddenFill>
             </a:ext>
-            <a:ext uri="{91240B29-F687-4f45-9708-019B960494DF}">
+            <a:ext uri="{91240B29-F687-4F45-9708-019B960494DF}">
               <a14:hiddenLine xmlns:a14="http://schemas.microsoft.com/office/drawing/2010/main" w="9525">
                 <a:solidFill>
                   <a:srgbClr val="000000"/>
@@ -6598,7 +6598,7 @@
                 <a:latin typeface="Garamond" charset="0"/>
               </a:rPr>
               <a:pPr/>
-              <a:t>9/21/15</a:t>
+              <a:t>9/23/2015</a:t>
             </a:fld>
             <a:endParaRPr lang="en-US" sz="1200">
               <a:latin typeface="Garamond" charset="0"/>
@@ -6645,14 +6645,14 @@
           <a:noFill/>
           <a:ln/>
           <a:extLst>
-            <a:ext uri="{909E8E84-426E-40dd-AFC4-6F175D3DCCD1}">
+            <a:ext uri="{909E8E84-426E-40DD-AFC4-6F175D3DCCD1}">
               <a14:hiddenFill xmlns:a14="http://schemas.microsoft.com/office/drawing/2010/main">
                 <a:solidFill>
                   <a:srgbClr val="FFFFFF"/>
                 </a:solidFill>
               </a14:hiddenFill>
             </a:ext>
-            <a:ext uri="{91240B29-F687-4f45-9708-019B960494DF}">
+            <a:ext uri="{91240B29-F687-4F45-9708-019B960494DF}">
               <a14:hiddenLine xmlns:a14="http://schemas.microsoft.com/office/drawing/2010/main" w="9525">
                 <a:solidFill>
                   <a:srgbClr val="000000"/>
@@ -6812,7 +6812,7 @@
   <p:timing>
     <p:tnLst>
       <p:par>
-        <p:cTn xmlns:p14="http://schemas.microsoft.com/office/powerpoint/2010/main" id="1" dur="indefinite" restart="never" nodeType="tmRoot"/>
+        <p:cTn id="1" dur="indefinite" restart="never" nodeType="tmRoot"/>
       </p:par>
     </p:tnLst>
   </p:timing>
@@ -7009,14 +7009,14 @@
           <a:noFill/>
           <a:ln/>
           <a:extLst>
-            <a:ext uri="{909E8E84-426E-40dd-AFC4-6F175D3DCCD1}">
+            <a:ext uri="{909E8E84-426E-40DD-AFC4-6F175D3DCCD1}">
               <a14:hiddenFill xmlns:a14="http://schemas.microsoft.com/office/drawing/2010/main">
                 <a:solidFill>
                   <a:srgbClr val="FFFFFF"/>
                 </a:solidFill>
               </a14:hiddenFill>
             </a:ext>
-            <a:ext uri="{91240B29-F687-4f45-9708-019B960494DF}">
+            <a:ext uri="{91240B29-F687-4F45-9708-019B960494DF}">
               <a14:hiddenLine xmlns:a14="http://schemas.microsoft.com/office/drawing/2010/main" w="9525">
                 <a:solidFill>
                   <a:srgbClr val="000000"/>
@@ -7124,7 +7124,7 @@
                 <a:latin typeface="Garamond" charset="0"/>
               </a:rPr>
               <a:pPr/>
-              <a:t>9/21/15</a:t>
+              <a:t>9/23/2015</a:t>
             </a:fld>
             <a:endParaRPr lang="en-US" sz="1200">
               <a:latin typeface="Garamond" charset="0"/>
@@ -7171,14 +7171,14 @@
           <a:noFill/>
           <a:ln/>
           <a:extLst>
-            <a:ext uri="{909E8E84-426E-40dd-AFC4-6F175D3DCCD1}">
+            <a:ext uri="{909E8E84-426E-40DD-AFC4-6F175D3DCCD1}">
               <a14:hiddenFill xmlns:a14="http://schemas.microsoft.com/office/drawing/2010/main">
                 <a:solidFill>
                   <a:srgbClr val="FFFFFF"/>
                 </a:solidFill>
               </a14:hiddenFill>
             </a:ext>
-            <a:ext uri="{91240B29-F687-4f45-9708-019B960494DF}">
+            <a:ext uri="{91240B29-F687-4F45-9708-019B960494DF}">
               <a14:hiddenLine xmlns:a14="http://schemas.microsoft.com/office/drawing/2010/main" w="9525">
                 <a:solidFill>
                   <a:srgbClr val="000000"/>
@@ -7320,7 +7320,7 @@
             <a:tailEnd/>
           </a:ln>
           <a:extLst>
-            <a:ext uri="{909E8E84-426E-40dd-AFC4-6F175D3DCCD1}">
+            <a:ext uri="{909E8E84-426E-40DD-AFC4-6F175D3DCCD1}">
               <a14:hiddenFill xmlns:a14="http://schemas.microsoft.com/office/drawing/2010/main">
                 <a:solidFill>
                   <a:srgbClr val="FFFFFF"/>
@@ -7362,14 +7362,14 @@
             <a:noFill/>
           </a:ln>
           <a:extLst>
-            <a:ext uri="{909E8E84-426E-40dd-AFC4-6F175D3DCCD1}">
+            <a:ext uri="{909E8E84-426E-40DD-AFC4-6F175D3DCCD1}">
               <a14:hiddenFill xmlns:a14="http://schemas.microsoft.com/office/drawing/2010/main">
                 <a:solidFill>
                   <a:srgbClr val="FFFFFF"/>
                 </a:solidFill>
               </a14:hiddenFill>
             </a:ext>
-            <a:ext uri="{91240B29-F687-4f45-9708-019B960494DF}">
+            <a:ext uri="{91240B29-F687-4F45-9708-019B960494DF}">
               <a14:hiddenLine xmlns:a14="http://schemas.microsoft.com/office/drawing/2010/main" w="9525">
                 <a:solidFill>
                   <a:srgbClr val="000000"/>
@@ -7507,14 +7507,14 @@
             <a:noFill/>
           </a:ln>
           <a:extLst>
-            <a:ext uri="{909E8E84-426E-40dd-AFC4-6F175D3DCCD1}">
+            <a:ext uri="{909E8E84-426E-40DD-AFC4-6F175D3DCCD1}">
               <a14:hiddenFill xmlns:a14="http://schemas.microsoft.com/office/drawing/2010/main">
                 <a:solidFill>
                   <a:srgbClr val="FFFFFF"/>
                 </a:solidFill>
               </a14:hiddenFill>
             </a:ext>
-            <a:ext uri="{91240B29-F687-4f45-9708-019B960494DF}">
+            <a:ext uri="{91240B29-F687-4F45-9708-019B960494DF}">
               <a14:hiddenLine xmlns:a14="http://schemas.microsoft.com/office/drawing/2010/main" w="9525">
                 <a:solidFill>
                   <a:srgbClr val="000000"/>
@@ -7657,7 +7657,7 @@
             <a:tailEnd/>
           </a:ln>
           <a:extLst>
-            <a:ext uri="{909E8E84-426E-40dd-AFC4-6F175D3DCCD1}">
+            <a:ext uri="{909E8E84-426E-40DD-AFC4-6F175D3DCCD1}">
               <a14:hiddenFill xmlns:a14="http://schemas.microsoft.com/office/drawing/2010/main">
                 <a:solidFill>
                   <a:srgbClr val="FFFFFF"/>
@@ -7873,7 +7873,7 @@
             <a:tailEnd/>
           </a:ln>
           <a:extLst>
-            <a:ext uri="{909E8E84-426E-40dd-AFC4-6F175D3DCCD1}">
+            <a:ext uri="{909E8E84-426E-40DD-AFC4-6F175D3DCCD1}">
               <a14:hiddenFill xmlns:a14="http://schemas.microsoft.com/office/drawing/2010/main">
                 <a:solidFill>
                   <a:srgbClr val="FFFFFF"/>
@@ -7915,14 +7915,14 @@
             <a:noFill/>
           </a:ln>
           <a:extLst>
-            <a:ext uri="{909E8E84-426E-40dd-AFC4-6F175D3DCCD1}">
+            <a:ext uri="{909E8E84-426E-40DD-AFC4-6F175D3DCCD1}">
               <a14:hiddenFill xmlns:a14="http://schemas.microsoft.com/office/drawing/2010/main">
                 <a:solidFill>
                   <a:srgbClr val="FFFFFF"/>
                 </a:solidFill>
               </a14:hiddenFill>
             </a:ext>
-            <a:ext uri="{91240B29-F687-4f45-9708-019B960494DF}">
+            <a:ext uri="{91240B29-F687-4F45-9708-019B960494DF}">
               <a14:hiddenLine xmlns:a14="http://schemas.microsoft.com/office/drawing/2010/main" w="9525">
                 <a:solidFill>
                   <a:srgbClr val="000000"/>
@@ -8060,14 +8060,14 @@
             <a:noFill/>
           </a:ln>
           <a:extLst>
-            <a:ext uri="{909E8E84-426E-40dd-AFC4-6F175D3DCCD1}">
+            <a:ext uri="{909E8E84-426E-40DD-AFC4-6F175D3DCCD1}">
               <a14:hiddenFill xmlns:a14="http://schemas.microsoft.com/office/drawing/2010/main">
                 <a:solidFill>
                   <a:srgbClr val="FFFFFF"/>
                 </a:solidFill>
               </a14:hiddenFill>
             </a:ext>
-            <a:ext uri="{91240B29-F687-4f45-9708-019B960494DF}">
+            <a:ext uri="{91240B29-F687-4F45-9708-019B960494DF}">
               <a14:hiddenLine xmlns:a14="http://schemas.microsoft.com/office/drawing/2010/main" w="9525">
                 <a:solidFill>
                   <a:srgbClr val="000000"/>
@@ -8210,7 +8210,7 @@
             <a:tailEnd/>
           </a:ln>
           <a:extLst>
-            <a:ext uri="{909E8E84-426E-40dd-AFC4-6F175D3DCCD1}">
+            <a:ext uri="{909E8E84-426E-40DD-AFC4-6F175D3DCCD1}">
               <a14:hiddenFill xmlns:a14="http://schemas.microsoft.com/office/drawing/2010/main">
                 <a:solidFill>
                   <a:srgbClr val="FFFFFF"/>
@@ -8485,14 +8485,14 @@
             <a:noFill/>
           </a:ln>
           <a:extLst>
-            <a:ext uri="{909E8E84-426E-40dd-AFC4-6F175D3DCCD1}">
+            <a:ext uri="{909E8E84-426E-40DD-AFC4-6F175D3DCCD1}">
               <a14:hiddenFill xmlns:a14="http://schemas.microsoft.com/office/drawing/2010/main">
                 <a:solidFill>
                   <a:srgbClr val="FFFFFF"/>
                 </a:solidFill>
               </a14:hiddenFill>
             </a:ext>
-            <a:ext uri="{91240B29-F687-4f45-9708-019B960494DF}">
+            <a:ext uri="{91240B29-F687-4F45-9708-019B960494DF}">
               <a14:hiddenLine xmlns:a14="http://schemas.microsoft.com/office/drawing/2010/main" w="9525">
                 <a:solidFill>
                   <a:srgbClr val="000000"/>
@@ -8635,7 +8635,7 @@
   <p:timing>
     <p:tnLst>
       <p:par>
-        <p:cTn xmlns:p14="http://schemas.microsoft.com/office/powerpoint/2010/main" id="1" dur="indefinite" restart="never" nodeType="tmRoot"/>
+        <p:cTn id="1" dur="indefinite" restart="never" nodeType="tmRoot"/>
       </p:par>
     </p:tnLst>
   </p:timing>
@@ -8704,14 +8704,14 @@
             <a:noFill/>
           </a:ln>
           <a:extLst>
-            <a:ext uri="{909E8E84-426E-40dd-AFC4-6F175D3DCCD1}">
+            <a:ext uri="{909E8E84-426E-40DD-AFC4-6F175D3DCCD1}">
               <a14:hiddenFill xmlns:a14="http://schemas.microsoft.com/office/drawing/2010/main">
                 <a:solidFill>
                   <a:srgbClr val="FFFFFF"/>
                 </a:solidFill>
               </a14:hiddenFill>
             </a:ext>
-            <a:ext uri="{91240B29-F687-4f45-9708-019B960494DF}">
+            <a:ext uri="{91240B29-F687-4F45-9708-019B960494DF}">
               <a14:hiddenLine xmlns:a14="http://schemas.microsoft.com/office/drawing/2010/main" w="9525">
                 <a:solidFill>
                   <a:srgbClr val="000000"/>
@@ -8933,14 +8933,14 @@
             <a:noFill/>
           </a:ln>
           <a:extLst>
-            <a:ext uri="{909E8E84-426E-40dd-AFC4-6F175D3DCCD1}">
+            <a:ext uri="{909E8E84-426E-40DD-AFC4-6F175D3DCCD1}">
               <a14:hiddenFill xmlns:a14="http://schemas.microsoft.com/office/drawing/2010/main">
                 <a:solidFill>
                   <a:srgbClr val="FFFFFF"/>
                 </a:solidFill>
               </a14:hiddenFill>
             </a:ext>
-            <a:ext uri="{91240B29-F687-4f45-9708-019B960494DF}">
+            <a:ext uri="{91240B29-F687-4F45-9708-019B960494DF}">
               <a14:hiddenLine xmlns:a14="http://schemas.microsoft.com/office/drawing/2010/main" w="9525">
                 <a:solidFill>
                   <a:srgbClr val="000000"/>
@@ -9166,14 +9166,14 @@
           <a:noFill/>
           <a:ln/>
           <a:extLst>
-            <a:ext uri="{909E8E84-426E-40dd-AFC4-6F175D3DCCD1}">
+            <a:ext uri="{909E8E84-426E-40DD-AFC4-6F175D3DCCD1}">
               <a14:hiddenFill xmlns:a14="http://schemas.microsoft.com/office/drawing/2010/main">
                 <a:solidFill>
                   <a:srgbClr val="FFFFFF"/>
                 </a:solidFill>
               </a14:hiddenFill>
             </a:ext>
-            <a:ext uri="{91240B29-F687-4f45-9708-019B960494DF}">
+            <a:ext uri="{91240B29-F687-4F45-9708-019B960494DF}">
               <a14:hiddenLine xmlns:a14="http://schemas.microsoft.com/office/drawing/2010/main" w="9525">
                 <a:solidFill>
                   <a:srgbClr val="000000"/>
@@ -9281,7 +9281,7 @@
                 <a:latin typeface="Garamond" charset="0"/>
               </a:rPr>
               <a:pPr/>
-              <a:t>9/21/15</a:t>
+              <a:t>9/23/2015</a:t>
             </a:fld>
             <a:endParaRPr lang="en-US" sz="1200">
               <a:latin typeface="Garamond" charset="0"/>
@@ -9303,14 +9303,14 @@
           <a:noFill/>
           <a:ln/>
           <a:extLst>
-            <a:ext uri="{909E8E84-426E-40dd-AFC4-6F175D3DCCD1}">
+            <a:ext uri="{909E8E84-426E-40DD-AFC4-6F175D3DCCD1}">
               <a14:hiddenFill xmlns:a14="http://schemas.microsoft.com/office/drawing/2010/main">
                 <a:solidFill>
                   <a:srgbClr val="FFFFFF"/>
                 </a:solidFill>
               </a14:hiddenFill>
             </a:ext>
-            <a:ext uri="{91240B29-F687-4f45-9708-019B960494DF}">
+            <a:ext uri="{91240B29-F687-4F45-9708-019B960494DF}">
               <a14:hiddenLine xmlns:a14="http://schemas.microsoft.com/office/drawing/2010/main" w="9525">
                 <a:solidFill>
                   <a:srgbClr val="000000"/>
@@ -9459,7 +9459,7 @@
   <p:timing>
     <p:tnLst>
       <p:par>
-        <p:cTn xmlns:p14="http://schemas.microsoft.com/office/powerpoint/2010/main" id="1" dur="indefinite" restart="never" nodeType="tmRoot"/>
+        <p:cTn id="1" dur="indefinite" restart="never" nodeType="tmRoot"/>
       </p:par>
     </p:tnLst>
   </p:timing>
@@ -9528,14 +9528,14 @@
             <a:noFill/>
           </a:ln>
           <a:extLst>
-            <a:ext uri="{909E8E84-426E-40dd-AFC4-6F175D3DCCD1}">
+            <a:ext uri="{909E8E84-426E-40DD-AFC4-6F175D3DCCD1}">
               <a14:hiddenFill xmlns:a14="http://schemas.microsoft.com/office/drawing/2010/main">
                 <a:solidFill>
                   <a:srgbClr val="FFFFFF"/>
                 </a:solidFill>
               </a14:hiddenFill>
             </a:ext>
-            <a:ext uri="{91240B29-F687-4f45-9708-019B960494DF}">
+            <a:ext uri="{91240B29-F687-4F45-9708-019B960494DF}">
               <a14:hiddenLine xmlns:a14="http://schemas.microsoft.com/office/drawing/2010/main" w="9525">
                 <a:solidFill>
                   <a:srgbClr val="000000"/>
@@ -9765,14 +9765,14 @@
             <a:noFill/>
           </a:ln>
           <a:extLst>
-            <a:ext uri="{909E8E84-426E-40dd-AFC4-6F175D3DCCD1}">
+            <a:ext uri="{909E8E84-426E-40DD-AFC4-6F175D3DCCD1}">
               <a14:hiddenFill xmlns:a14="http://schemas.microsoft.com/office/drawing/2010/main">
                 <a:solidFill>
                   <a:srgbClr val="FFFFFF"/>
                 </a:solidFill>
               </a14:hiddenFill>
             </a:ext>
-            <a:ext uri="{91240B29-F687-4f45-9708-019B960494DF}">
+            <a:ext uri="{91240B29-F687-4F45-9708-019B960494DF}">
               <a14:hiddenLine xmlns:a14="http://schemas.microsoft.com/office/drawing/2010/main" w="9525">
                 <a:solidFill>
                   <a:srgbClr val="000000"/>
@@ -9998,14 +9998,14 @@
           <a:noFill/>
           <a:ln/>
           <a:extLst>
-            <a:ext uri="{909E8E84-426E-40dd-AFC4-6F175D3DCCD1}">
+            <a:ext uri="{909E8E84-426E-40DD-AFC4-6F175D3DCCD1}">
               <a14:hiddenFill xmlns:a14="http://schemas.microsoft.com/office/drawing/2010/main">
                 <a:solidFill>
                   <a:srgbClr val="FFFFFF"/>
                 </a:solidFill>
               </a14:hiddenFill>
             </a:ext>
-            <a:ext uri="{91240B29-F687-4f45-9708-019B960494DF}">
+            <a:ext uri="{91240B29-F687-4F45-9708-019B960494DF}">
               <a14:hiddenLine xmlns:a14="http://schemas.microsoft.com/office/drawing/2010/main" w="9525">
                 <a:solidFill>
                   <a:srgbClr val="000000"/>
@@ -10113,7 +10113,7 @@
                 <a:latin typeface="Garamond" charset="0"/>
               </a:rPr>
               <a:pPr/>
-              <a:t>9/21/15</a:t>
+              <a:t>9/23/2015</a:t>
             </a:fld>
             <a:endParaRPr lang="en-US" sz="1200">
               <a:latin typeface="Garamond" charset="0"/>
@@ -10135,14 +10135,14 @@
           <a:noFill/>
           <a:ln/>
           <a:extLst>
-            <a:ext uri="{909E8E84-426E-40dd-AFC4-6F175D3DCCD1}">
+            <a:ext uri="{909E8E84-426E-40DD-AFC4-6F175D3DCCD1}">
               <a14:hiddenFill xmlns:a14="http://schemas.microsoft.com/office/drawing/2010/main">
                 <a:solidFill>
                   <a:srgbClr val="FFFFFF"/>
                 </a:solidFill>
               </a14:hiddenFill>
             </a:ext>
-            <a:ext uri="{91240B29-F687-4f45-9708-019B960494DF}">
+            <a:ext uri="{91240B29-F687-4F45-9708-019B960494DF}">
               <a14:hiddenLine xmlns:a14="http://schemas.microsoft.com/office/drawing/2010/main" w="9525">
                 <a:solidFill>
                   <a:srgbClr val="000000"/>
@@ -10291,7 +10291,7 @@
   <p:timing>
     <p:tnLst>
       <p:par>
-        <p:cTn xmlns:p14="http://schemas.microsoft.com/office/powerpoint/2010/main" id="1" dur="indefinite" restart="never" nodeType="tmRoot"/>
+        <p:cTn id="1" dur="indefinite" restart="never" nodeType="tmRoot"/>
       </p:par>
     </p:tnLst>
   </p:timing>
@@ -10357,7 +10357,7 @@
         </p:spPr>
         <p:txBody>
           <a:bodyPr>
-            <a:normAutofit fontScale="62500" lnSpcReduction="20000"/>
+            <a:normAutofit fontScale="70000" lnSpcReduction="20000"/>
           </a:bodyPr>
           <a:lstStyle/>
           <a:p>
@@ -10392,7 +10392,7 @@
               <a:defRPr/>
             </a:pPr>
             <a:r>
-              <a:rPr lang="en-US" sz="3200" dirty="0" smtClean="0">
+              <a:rPr lang="en-US" sz="2600" dirty="0" smtClean="0">
                 <a:latin typeface="Courier New" pitchFamily="49" charset="0"/>
                 <a:ea typeface="+mn-ea"/>
                 <a:cs typeface="Courier New" pitchFamily="49" charset="0"/>
@@ -10407,7 +10407,7 @@
               <a:defRPr/>
             </a:pPr>
             <a:r>
-              <a:rPr lang="en-US" sz="3200" dirty="0" err="1" smtClean="0">
+              <a:rPr lang="en-US" sz="2600" dirty="0" err="1" smtClean="0">
                 <a:latin typeface="Courier New" pitchFamily="49" charset="0"/>
                 <a:ea typeface="+mn-ea"/>
                 <a:cs typeface="Courier New" pitchFamily="49" charset="0"/>
@@ -10415,7 +10415,7 @@
               <a:t>printf</a:t>
             </a:r>
             <a:r>
-              <a:rPr lang="en-US" sz="3200" dirty="0" smtClean="0">
+              <a:rPr lang="en-US" sz="2600" dirty="0" smtClean="0">
                 <a:latin typeface="Courier New" pitchFamily="49" charset="0"/>
                 <a:ea typeface="+mn-ea"/>
                 <a:cs typeface="Courier New" pitchFamily="49" charset="0"/>
@@ -10430,7 +10430,7 @@
               <a:defRPr/>
             </a:pPr>
             <a:r>
-              <a:rPr lang="en-US" sz="3200" dirty="0" err="1" smtClean="0">
+              <a:rPr lang="en-US" sz="2600" dirty="0" err="1" smtClean="0">
                 <a:latin typeface="Courier New" pitchFamily="49" charset="0"/>
                 <a:ea typeface="+mn-ea"/>
                 <a:cs typeface="Courier New" pitchFamily="49" charset="0"/>
@@ -10438,7 +10438,7 @@
               <a:t>scanf</a:t>
             </a:r>
             <a:r>
-              <a:rPr lang="en-US" sz="3200" dirty="0" smtClean="0">
+              <a:rPr lang="en-US" sz="2600" dirty="0" smtClean="0">
                 <a:latin typeface="Courier New" pitchFamily="49" charset="0"/>
                 <a:ea typeface="+mn-ea"/>
                 <a:cs typeface="Courier New" pitchFamily="49" charset="0"/>
@@ -10452,7 +10452,7 @@
               <a:buNone/>
               <a:defRPr/>
             </a:pPr>
-            <a:endParaRPr lang="en-US" sz="3200" dirty="0" smtClean="0">
+            <a:endParaRPr lang="en-US" sz="2600" dirty="0" smtClean="0">
               <a:latin typeface="Courier New" pitchFamily="49" charset="0"/>
               <a:ea typeface="+mn-ea"/>
               <a:cs typeface="Courier New" pitchFamily="49" charset="0"/>
@@ -10465,7 +10465,7 @@
               <a:defRPr/>
             </a:pPr>
             <a:r>
-              <a:rPr lang="en-US" sz="3200" dirty="0" smtClean="0">
+              <a:rPr lang="en-US" sz="2600" dirty="0" smtClean="0">
                 <a:latin typeface="Courier New" pitchFamily="49" charset="0"/>
                 <a:ea typeface="+mn-ea"/>
                 <a:cs typeface="Courier New" pitchFamily="49" charset="0"/>
@@ -10480,7 +10480,7 @@
               <a:defRPr/>
             </a:pPr>
             <a:r>
-              <a:rPr lang="en-US" sz="3200" dirty="0" smtClean="0">
+              <a:rPr lang="en-US" sz="2600" dirty="0" smtClean="0">
                 <a:latin typeface="Courier New" pitchFamily="49" charset="0"/>
                 <a:ea typeface="+mn-ea"/>
                 <a:cs typeface="Courier New" pitchFamily="49" charset="0"/>
@@ -10495,7 +10495,7 @@
               <a:defRPr/>
             </a:pPr>
             <a:r>
-              <a:rPr lang="en-US" sz="3200" dirty="0" smtClean="0">
+              <a:rPr lang="en-US" sz="2600" dirty="0" smtClean="0">
                 <a:latin typeface="Courier New" pitchFamily="49" charset="0"/>
                 <a:ea typeface="+mn-ea"/>
                 <a:cs typeface="Courier New" pitchFamily="49" charset="0"/>
@@ -10510,12 +10510,28 @@
               <a:defRPr/>
             </a:pPr>
             <a:r>
-              <a:rPr lang="pt-BR" sz="3200" dirty="0" smtClean="0">
+              <a:rPr lang="pt-BR" sz="2600" dirty="0" smtClean="0">
                 <a:latin typeface="Courier New" pitchFamily="49" charset="0"/>
                 <a:ea typeface="+mn-ea"/>
                 <a:cs typeface="Courier New" pitchFamily="49" charset="0"/>
               </a:rPr>
-              <a:t>	gradeSum = gradeSum + grade;	// Accumulate grade</a:t>
+              <a:t>	gradeSum = gradeSum + grade</a:t>
+            </a:r>
+            <a:r>
+              <a:rPr lang="pt-BR" sz="2600" dirty="0" smtClean="0">
+                <a:latin typeface="Courier New" pitchFamily="49" charset="0"/>
+                <a:ea typeface="+mn-ea"/>
+                <a:cs typeface="Courier New" pitchFamily="49" charset="0"/>
+              </a:rPr>
+              <a:t>;	// </a:t>
+            </a:r>
+            <a:r>
+              <a:rPr lang="pt-BR" sz="2600" dirty="0" smtClean="0">
+                <a:latin typeface="Courier New" pitchFamily="49" charset="0"/>
+                <a:ea typeface="+mn-ea"/>
+                <a:cs typeface="Courier New" pitchFamily="49" charset="0"/>
+              </a:rPr>
+              <a:t>Accumulate grade</a:t>
             </a:r>
           </a:p>
           <a:p>
@@ -10525,7 +10541,7 @@
               <a:defRPr/>
             </a:pPr>
             <a:r>
-              <a:rPr lang="en-US" sz="3200" dirty="0" smtClean="0">
+              <a:rPr lang="en-US" sz="2600" dirty="0" smtClean="0">
                 <a:latin typeface="Courier New" pitchFamily="49" charset="0"/>
                 <a:ea typeface="+mn-ea"/>
                 <a:cs typeface="Courier New" pitchFamily="49" charset="0"/>
@@ -10533,7 +10549,7 @@
               <a:t>	</a:t>
             </a:r>
             <a:r>
-              <a:rPr lang="en-US" sz="3200" dirty="0" err="1" smtClean="0">
+              <a:rPr lang="en-US" sz="2600" dirty="0" err="1" smtClean="0">
                 <a:latin typeface="Courier New" pitchFamily="49" charset="0"/>
                 <a:ea typeface="+mn-ea"/>
                 <a:cs typeface="Courier New" pitchFamily="49" charset="0"/>
@@ -10541,7 +10557,7 @@
               <a:t>gradeCount</a:t>
             </a:r>
             <a:r>
-              <a:rPr lang="en-US" sz="3200" dirty="0" smtClean="0">
+              <a:rPr lang="en-US" sz="2600" dirty="0" smtClean="0">
                 <a:latin typeface="Courier New" pitchFamily="49" charset="0"/>
                 <a:ea typeface="+mn-ea"/>
                 <a:cs typeface="Courier New" pitchFamily="49" charset="0"/>
@@ -10549,7 +10565,7 @@
               <a:t> = </a:t>
             </a:r>
             <a:r>
-              <a:rPr lang="en-US" sz="3200" dirty="0" err="1" smtClean="0">
+              <a:rPr lang="en-US" sz="2600" dirty="0" err="1" smtClean="0">
                 <a:latin typeface="Courier New" pitchFamily="49" charset="0"/>
                 <a:ea typeface="+mn-ea"/>
                 <a:cs typeface="Courier New" pitchFamily="49" charset="0"/>
@@ -10557,12 +10573,28 @@
               <a:t>gradeCount</a:t>
             </a:r>
             <a:r>
-              <a:rPr lang="en-US" sz="3200" dirty="0" smtClean="0">
+              <a:rPr lang="en-US" sz="2600" dirty="0" smtClean="0">
                 <a:latin typeface="Courier New" pitchFamily="49" charset="0"/>
                 <a:ea typeface="+mn-ea"/>
                 <a:cs typeface="Courier New" pitchFamily="49" charset="0"/>
               </a:rPr>
-              <a:t> + 1;	// Increment grade count</a:t>
+              <a:t> + 1</a:t>
+            </a:r>
+            <a:r>
+              <a:rPr lang="en-US" sz="2600" dirty="0" smtClean="0">
+                <a:latin typeface="Courier New" pitchFamily="49" charset="0"/>
+                <a:ea typeface="+mn-ea"/>
+                <a:cs typeface="Courier New" pitchFamily="49" charset="0"/>
+              </a:rPr>
+              <a:t>;	// </a:t>
+            </a:r>
+            <a:r>
+              <a:rPr lang="en-US" sz="2600" dirty="0" smtClean="0">
+                <a:latin typeface="Courier New" pitchFamily="49" charset="0"/>
+                <a:ea typeface="+mn-ea"/>
+                <a:cs typeface="Courier New" pitchFamily="49" charset="0"/>
+              </a:rPr>
+              <a:t>Increment grade count</a:t>
             </a:r>
           </a:p>
           <a:p>
@@ -10572,7 +10604,7 @@
               <a:defRPr/>
             </a:pPr>
             <a:r>
-              <a:rPr lang="en-US" sz="3200" dirty="0" smtClean="0">
+              <a:rPr lang="en-US" sz="2600" dirty="0" smtClean="0">
                 <a:latin typeface="Courier New" pitchFamily="49" charset="0"/>
                 <a:ea typeface="+mn-ea"/>
                 <a:cs typeface="Courier New" pitchFamily="49" charset="0"/>
@@ -10580,7 +10612,7 @@
               <a:t>	</a:t>
             </a:r>
             <a:r>
-              <a:rPr lang="en-US" sz="3200" dirty="0" err="1" smtClean="0">
+              <a:rPr lang="en-US" sz="2600" dirty="0" err="1" smtClean="0">
                 <a:latin typeface="Courier New" pitchFamily="49" charset="0"/>
                 <a:ea typeface="+mn-ea"/>
                 <a:cs typeface="Courier New" pitchFamily="49" charset="0"/>
@@ -10588,7 +10620,7 @@
               <a:t>printf</a:t>
             </a:r>
             <a:r>
-              <a:rPr lang="en-US" sz="3200" dirty="0" smtClean="0">
+              <a:rPr lang="en-US" sz="2600" dirty="0" smtClean="0">
                 <a:latin typeface="Courier New" pitchFamily="49" charset="0"/>
                 <a:ea typeface="+mn-ea"/>
                 <a:cs typeface="Courier New" pitchFamily="49" charset="0"/>
@@ -10603,7 +10635,7 @@
               <a:defRPr/>
             </a:pPr>
             <a:r>
-              <a:rPr lang="en-US" sz="3200" dirty="0" smtClean="0">
+              <a:rPr lang="en-US" sz="2600" dirty="0" smtClean="0">
                 <a:latin typeface="Courier New" pitchFamily="49" charset="0"/>
                 <a:ea typeface="+mn-ea"/>
                 <a:cs typeface="Courier New" pitchFamily="49" charset="0"/>
@@ -10611,7 +10643,7 @@
               <a:t>	</a:t>
             </a:r>
             <a:r>
-              <a:rPr lang="en-US" sz="3200" dirty="0" err="1" smtClean="0">
+              <a:rPr lang="en-US" sz="2600" dirty="0" err="1" smtClean="0">
                 <a:latin typeface="Courier New" pitchFamily="49" charset="0"/>
                 <a:ea typeface="+mn-ea"/>
                 <a:cs typeface="Courier New" pitchFamily="49" charset="0"/>
@@ -10619,7 +10651,7 @@
               <a:t>scanf</a:t>
             </a:r>
             <a:r>
-              <a:rPr lang="en-US" sz="3200" dirty="0" smtClean="0">
+              <a:rPr lang="en-US" sz="2600" dirty="0" smtClean="0">
                 <a:latin typeface="Courier New" pitchFamily="49" charset="0"/>
                 <a:ea typeface="+mn-ea"/>
                 <a:cs typeface="Courier New" pitchFamily="49" charset="0"/>
@@ -10634,7 +10666,7 @@
               <a:defRPr/>
             </a:pPr>
             <a:r>
-              <a:rPr lang="en-US" sz="3200" dirty="0" smtClean="0">
+              <a:rPr lang="en-US" sz="2600" dirty="0" smtClean="0">
                 <a:latin typeface="Courier New" pitchFamily="49" charset="0"/>
                 <a:ea typeface="+mn-ea"/>
                 <a:cs typeface="Courier New" pitchFamily="49" charset="0"/>
@@ -10666,14 +10698,14 @@
           <a:noFill/>
           <a:ln/>
           <a:extLst>
-            <a:ext uri="{909E8E84-426E-40dd-AFC4-6F175D3DCCD1}">
+            <a:ext uri="{909E8E84-426E-40DD-AFC4-6F175D3DCCD1}">
               <a14:hiddenFill xmlns:a14="http://schemas.microsoft.com/office/drawing/2010/main">
                 <a:solidFill>
                   <a:srgbClr val="FFFFFF"/>
                 </a:solidFill>
               </a14:hiddenFill>
             </a:ext>
-            <a:ext uri="{91240B29-F687-4f45-9708-019B960494DF}">
+            <a:ext uri="{91240B29-F687-4F45-9708-019B960494DF}">
               <a14:hiddenLine xmlns:a14="http://schemas.microsoft.com/office/drawing/2010/main" w="9525">
                 <a:solidFill>
                   <a:srgbClr val="000000"/>
@@ -10781,7 +10813,7 @@
                 <a:latin typeface="Garamond" charset="0"/>
               </a:rPr>
               <a:pPr/>
-              <a:t>9/21/15</a:t>
+              <a:t>9/23/2015</a:t>
             </a:fld>
             <a:endParaRPr lang="en-US" sz="1200">
               <a:latin typeface="Garamond" charset="0"/>
@@ -10828,14 +10860,14 @@
           <a:noFill/>
           <a:ln/>
           <a:extLst>
-            <a:ext uri="{909E8E84-426E-40dd-AFC4-6F175D3DCCD1}">
+            <a:ext uri="{909E8E84-426E-40DD-AFC4-6F175D3DCCD1}">
               <a14:hiddenFill xmlns:a14="http://schemas.microsoft.com/office/drawing/2010/main">
                 <a:solidFill>
                   <a:srgbClr val="FFFFFF"/>
                 </a:solidFill>
               </a14:hiddenFill>
             </a:ext>
-            <a:ext uri="{91240B29-F687-4f45-9708-019B960494DF}">
+            <a:ext uri="{91240B29-F687-4F45-9708-019B960494DF}">
               <a14:hiddenLine xmlns:a14="http://schemas.microsoft.com/office/drawing/2010/main" w="9525">
                 <a:solidFill>
                   <a:srgbClr val="000000"/>
@@ -10959,7 +10991,7 @@
   <p:timing>
     <p:tnLst>
       <p:par>
-        <p:cTn xmlns:p14="http://schemas.microsoft.com/office/powerpoint/2010/main" id="1" dur="indefinite" restart="never" nodeType="tmRoot"/>
+        <p:cTn id="1" dur="indefinite" restart="never" nodeType="tmRoot"/>
       </p:par>
     </p:tnLst>
   </p:timing>
@@ -11335,14 +11367,14 @@
           <a:noFill/>
           <a:ln/>
           <a:extLst>
-            <a:ext uri="{909E8E84-426E-40dd-AFC4-6F175D3DCCD1}">
+            <a:ext uri="{909E8E84-426E-40DD-AFC4-6F175D3DCCD1}">
               <a14:hiddenFill xmlns:a14="http://schemas.microsoft.com/office/drawing/2010/main">
                 <a:solidFill>
                   <a:srgbClr val="FFFFFF"/>
                 </a:solidFill>
               </a14:hiddenFill>
             </a:ext>
-            <a:ext uri="{91240B29-F687-4f45-9708-019B960494DF}">
+            <a:ext uri="{91240B29-F687-4F45-9708-019B960494DF}">
               <a14:hiddenLine xmlns:a14="http://schemas.microsoft.com/office/drawing/2010/main" w="9525">
                 <a:solidFill>
                   <a:srgbClr val="000000"/>
@@ -11450,7 +11482,7 @@
                 <a:latin typeface="Garamond" charset="0"/>
               </a:rPr>
               <a:pPr/>
-              <a:t>9/21/15</a:t>
+              <a:t>9/23/2015</a:t>
             </a:fld>
             <a:endParaRPr lang="en-US" sz="1200">
               <a:latin typeface="Garamond" charset="0"/>
@@ -11497,14 +11529,14 @@
           <a:noFill/>
           <a:ln/>
           <a:extLst>
-            <a:ext uri="{909E8E84-426E-40dd-AFC4-6F175D3DCCD1}">
+            <a:ext uri="{909E8E84-426E-40DD-AFC4-6F175D3DCCD1}">
               <a14:hiddenFill xmlns:a14="http://schemas.microsoft.com/office/drawing/2010/main">
                 <a:solidFill>
                   <a:srgbClr val="FFFFFF"/>
                 </a:solidFill>
               </a14:hiddenFill>
             </a:ext>
-            <a:ext uri="{91240B29-F687-4f45-9708-019B960494DF}">
+            <a:ext uri="{91240B29-F687-4F45-9708-019B960494DF}">
               <a14:hiddenLine xmlns:a14="http://schemas.microsoft.com/office/drawing/2010/main" w="9525">
                 <a:solidFill>
                   <a:srgbClr val="000000"/>
@@ -11628,7 +11660,7 @@
   <p:timing>
     <p:tnLst>
       <p:par>
-        <p:cTn xmlns:p14="http://schemas.microsoft.com/office/powerpoint/2010/main" id="1" dur="indefinite" restart="never" nodeType="tmRoot"/>
+        <p:cTn id="1" dur="indefinite" restart="never" nodeType="tmRoot"/>
       </p:par>
     </p:tnLst>
   </p:timing>
@@ -11779,14 +11811,14 @@
           <a:noFill/>
           <a:ln/>
           <a:extLst>
-            <a:ext uri="{909E8E84-426E-40dd-AFC4-6F175D3DCCD1}">
+            <a:ext uri="{909E8E84-426E-40DD-AFC4-6F175D3DCCD1}">
               <a14:hiddenFill xmlns:a14="http://schemas.microsoft.com/office/drawing/2010/main">
                 <a:solidFill>
                   <a:srgbClr val="FFFFFF"/>
                 </a:solidFill>
               </a14:hiddenFill>
             </a:ext>
-            <a:ext uri="{91240B29-F687-4f45-9708-019B960494DF}">
+            <a:ext uri="{91240B29-F687-4F45-9708-019B960494DF}">
               <a14:hiddenLine xmlns:a14="http://schemas.microsoft.com/office/drawing/2010/main" w="9525">
                 <a:solidFill>
                   <a:srgbClr val="000000"/>
@@ -11894,7 +11926,7 @@
                 <a:latin typeface="Garamond" charset="0"/>
               </a:rPr>
               <a:pPr/>
-              <a:t>9/21/15</a:t>
+              <a:t>9/23/2015</a:t>
             </a:fld>
             <a:endParaRPr lang="en-US" sz="1200">
               <a:latin typeface="Garamond" charset="0"/>
@@ -11941,14 +11973,14 @@
           <a:noFill/>
           <a:ln/>
           <a:extLst>
-            <a:ext uri="{909E8E84-426E-40dd-AFC4-6F175D3DCCD1}">
+            <a:ext uri="{909E8E84-426E-40DD-AFC4-6F175D3DCCD1}">
               <a14:hiddenFill xmlns:a14="http://schemas.microsoft.com/office/drawing/2010/main">
                 <a:solidFill>
                   <a:srgbClr val="FFFFFF"/>
                 </a:solidFill>
               </a14:hiddenFill>
             </a:ext>
-            <a:ext uri="{91240B29-F687-4f45-9708-019B960494DF}">
+            <a:ext uri="{91240B29-F687-4F45-9708-019B960494DF}">
               <a14:hiddenLine xmlns:a14="http://schemas.microsoft.com/office/drawing/2010/main" w="9525">
                 <a:solidFill>
                   <a:srgbClr val="000000"/>
@@ -12072,7 +12104,7 @@
   <p:timing>
     <p:tnLst>
       <p:par>
-        <p:cTn xmlns:p14="http://schemas.microsoft.com/office/powerpoint/2010/main" id="1" dur="indefinite" restart="never" nodeType="tmRoot"/>
+        <p:cTn id="1" dur="indefinite" restart="never" nodeType="tmRoot"/>
       </p:par>
     </p:tnLst>
   </p:timing>
@@ -12234,14 +12266,14 @@
           <a:noFill/>
           <a:ln/>
           <a:extLst>
-            <a:ext uri="{909E8E84-426E-40dd-AFC4-6F175D3DCCD1}">
+            <a:ext uri="{909E8E84-426E-40DD-AFC4-6F175D3DCCD1}">
               <a14:hiddenFill xmlns:a14="http://schemas.microsoft.com/office/drawing/2010/main">
                 <a:solidFill>
                   <a:srgbClr val="FFFFFF"/>
                 </a:solidFill>
               </a14:hiddenFill>
             </a:ext>
-            <a:ext uri="{91240B29-F687-4f45-9708-019B960494DF}">
+            <a:ext uri="{91240B29-F687-4F45-9708-019B960494DF}">
               <a14:hiddenLine xmlns:a14="http://schemas.microsoft.com/office/drawing/2010/main" w="9525">
                 <a:solidFill>
                   <a:srgbClr val="000000"/>
@@ -12349,7 +12381,7 @@
                 <a:latin typeface="Garamond" charset="0"/>
               </a:rPr>
               <a:pPr/>
-              <a:t>9/21/15</a:t>
+              <a:t>9/23/2015</a:t>
             </a:fld>
             <a:endParaRPr lang="en-US" sz="1200">
               <a:latin typeface="Garamond" charset="0"/>
@@ -12397,14 +12429,14 @@
           <a:noFill/>
           <a:ln/>
           <a:extLst>
-            <a:ext uri="{909E8E84-426E-40dd-AFC4-6F175D3DCCD1}">
+            <a:ext uri="{909E8E84-426E-40DD-AFC4-6F175D3DCCD1}">
               <a14:hiddenFill xmlns:a14="http://schemas.microsoft.com/office/drawing/2010/main">
                 <a:solidFill>
                   <a:srgbClr val="FFFFFF"/>
                 </a:solidFill>
               </a14:hiddenFill>
             </a:ext>
-            <a:ext uri="{91240B29-F687-4f45-9708-019B960494DF}">
+            <a:ext uri="{91240B29-F687-4F45-9708-019B960494DF}">
               <a14:hiddenLine xmlns:a14="http://schemas.microsoft.com/office/drawing/2010/main" w="9525">
                 <a:solidFill>
                   <a:srgbClr val="000000"/>
@@ -12528,7 +12560,7 @@
   <p:timing>
     <p:tnLst>
       <p:par>
-        <p:cTn xmlns:p14="http://schemas.microsoft.com/office/powerpoint/2010/main" id="1" dur="indefinite" restart="never" nodeType="tmRoot"/>
+        <p:cTn id="1" dur="indefinite" restart="never" nodeType="tmRoot"/>
       </p:par>
     </p:tnLst>
   </p:timing>
@@ -12865,14 +12897,14 @@
           <a:noFill/>
           <a:ln/>
           <a:extLst>
-            <a:ext uri="{909E8E84-426E-40dd-AFC4-6F175D3DCCD1}">
+            <a:ext uri="{909E8E84-426E-40DD-AFC4-6F175D3DCCD1}">
               <a14:hiddenFill xmlns:a14="http://schemas.microsoft.com/office/drawing/2010/main">
                 <a:solidFill>
                   <a:srgbClr val="FFFFFF"/>
                 </a:solidFill>
               </a14:hiddenFill>
             </a:ext>
-            <a:ext uri="{91240B29-F687-4f45-9708-019B960494DF}">
+            <a:ext uri="{91240B29-F687-4F45-9708-019B960494DF}">
               <a14:hiddenLine xmlns:a14="http://schemas.microsoft.com/office/drawing/2010/main" w="9525">
                 <a:solidFill>
                   <a:srgbClr val="000000"/>
@@ -12980,7 +13012,7 @@
                 <a:latin typeface="Garamond" charset="0"/>
               </a:rPr>
               <a:pPr/>
-              <a:t>9/21/15</a:t>
+              <a:t>9/23/2015</a:t>
             </a:fld>
             <a:endParaRPr lang="en-US" sz="1200">
               <a:latin typeface="Garamond" charset="0"/>
@@ -13027,14 +13059,14 @@
           <a:noFill/>
           <a:ln/>
           <a:extLst>
-            <a:ext uri="{909E8E84-426E-40dd-AFC4-6F175D3DCCD1}">
+            <a:ext uri="{909E8E84-426E-40DD-AFC4-6F175D3DCCD1}">
               <a14:hiddenFill xmlns:a14="http://schemas.microsoft.com/office/drawing/2010/main">
                 <a:solidFill>
                   <a:srgbClr val="FFFFFF"/>
                 </a:solidFill>
               </a14:hiddenFill>
             </a:ext>
-            <a:ext uri="{91240B29-F687-4f45-9708-019B960494DF}">
+            <a:ext uri="{91240B29-F687-4F45-9708-019B960494DF}">
               <a14:hiddenLine xmlns:a14="http://schemas.microsoft.com/office/drawing/2010/main" w="9525">
                 <a:solidFill>
                   <a:srgbClr val="000000"/>
@@ -13158,7 +13190,7 @@
   <p:timing>
     <p:tnLst>
       <p:par>
-        <p:cTn xmlns:p14="http://schemas.microsoft.com/office/powerpoint/2010/main" id="1" dur="indefinite" restart="never" nodeType="tmRoot"/>
+        <p:cTn id="1" dur="indefinite" restart="never" nodeType="tmRoot"/>
       </p:par>
     </p:tnLst>
   </p:timing>
@@ -13863,14 +13895,14 @@
           <a:noFill/>
           <a:ln/>
           <a:extLst>
-            <a:ext uri="{909E8E84-426E-40dd-AFC4-6F175D3DCCD1}">
+            <a:ext uri="{909E8E84-426E-40DD-AFC4-6F175D3DCCD1}">
               <a14:hiddenFill xmlns:a14="http://schemas.microsoft.com/office/drawing/2010/main">
                 <a:solidFill>
                   <a:srgbClr val="FFFFFF"/>
                 </a:solidFill>
               </a14:hiddenFill>
             </a:ext>
-            <a:ext uri="{91240B29-F687-4f45-9708-019B960494DF}">
+            <a:ext uri="{91240B29-F687-4F45-9708-019B960494DF}">
               <a14:hiddenLine xmlns:a14="http://schemas.microsoft.com/office/drawing/2010/main" w="9525">
                 <a:solidFill>
                   <a:srgbClr val="000000"/>
@@ -13978,7 +14010,7 @@
                 <a:latin typeface="Garamond" charset="0"/>
               </a:rPr>
               <a:pPr/>
-              <a:t>9/21/15</a:t>
+              <a:t>9/23/2015</a:t>
             </a:fld>
             <a:endParaRPr lang="en-US" sz="1200">
               <a:latin typeface="Garamond" charset="0"/>
@@ -14025,14 +14057,14 @@
           <a:noFill/>
           <a:ln/>
           <a:extLst>
-            <a:ext uri="{909E8E84-426E-40dd-AFC4-6F175D3DCCD1}">
+            <a:ext uri="{909E8E84-426E-40DD-AFC4-6F175D3DCCD1}">
               <a14:hiddenFill xmlns:a14="http://schemas.microsoft.com/office/drawing/2010/main">
                 <a:solidFill>
                   <a:srgbClr val="FFFFFF"/>
                 </a:solidFill>
               </a14:hiddenFill>
             </a:ext>
-            <a:ext uri="{91240B29-F687-4f45-9708-019B960494DF}">
+            <a:ext uri="{91240B29-F687-4F45-9708-019B960494DF}">
               <a14:hiddenLine xmlns:a14="http://schemas.microsoft.com/office/drawing/2010/main" w="9525">
                 <a:solidFill>
                   <a:srgbClr val="000000"/>
@@ -14156,7 +14188,7 @@
   <p:timing>
     <p:tnLst>
       <p:par>
-        <p:cTn xmlns:p14="http://schemas.microsoft.com/office/powerpoint/2010/main" id="1" dur="indefinite" restart="never" nodeType="tmRoot"/>
+        <p:cTn id="1" dur="indefinite" restart="never" nodeType="tmRoot"/>
       </p:par>
     </p:tnLst>
   </p:timing>
@@ -14455,14 +14487,14 @@
           <a:noFill/>
           <a:ln/>
           <a:extLst>
-            <a:ext uri="{909E8E84-426E-40dd-AFC4-6F175D3DCCD1}">
+            <a:ext uri="{909E8E84-426E-40DD-AFC4-6F175D3DCCD1}">
               <a14:hiddenFill xmlns:a14="http://schemas.microsoft.com/office/drawing/2010/main">
                 <a:solidFill>
                   <a:srgbClr val="FFFFFF"/>
                 </a:solidFill>
               </a14:hiddenFill>
             </a:ext>
-            <a:ext uri="{91240B29-F687-4f45-9708-019B960494DF}">
+            <a:ext uri="{91240B29-F687-4F45-9708-019B960494DF}">
               <a14:hiddenLine xmlns:a14="http://schemas.microsoft.com/office/drawing/2010/main" w="9525">
                 <a:solidFill>
                   <a:srgbClr val="000000"/>
@@ -14570,7 +14602,7 @@
                 <a:latin typeface="Garamond" charset="0"/>
               </a:rPr>
               <a:pPr/>
-              <a:t>9/21/15</a:t>
+              <a:t>9/23/2015</a:t>
             </a:fld>
             <a:endParaRPr lang="en-US" sz="1200">
               <a:latin typeface="Garamond" charset="0"/>
@@ -14617,14 +14649,14 @@
           <a:noFill/>
           <a:ln/>
           <a:extLst>
-            <a:ext uri="{909E8E84-426E-40dd-AFC4-6F175D3DCCD1}">
+            <a:ext uri="{909E8E84-426E-40DD-AFC4-6F175D3DCCD1}">
               <a14:hiddenFill xmlns:a14="http://schemas.microsoft.com/office/drawing/2010/main">
                 <a:solidFill>
                   <a:srgbClr val="FFFFFF"/>
                 </a:solidFill>
               </a14:hiddenFill>
             </a:ext>
-            <a:ext uri="{91240B29-F687-4f45-9708-019B960494DF}">
+            <a:ext uri="{91240B29-F687-4F45-9708-019B960494DF}">
               <a14:hiddenLine xmlns:a14="http://schemas.microsoft.com/office/drawing/2010/main" w="9525">
                 <a:solidFill>
                   <a:srgbClr val="000000"/>
@@ -14748,7 +14780,7 @@
   <p:timing>
     <p:tnLst>
       <p:par>
-        <p:cTn xmlns:p14="http://schemas.microsoft.com/office/powerpoint/2010/main" id="1" dur="indefinite" restart="never" nodeType="tmRoot"/>
+        <p:cTn id="1" dur="indefinite" restart="never" nodeType="tmRoot"/>
       </p:par>
     </p:tnLst>
   </p:timing>
@@ -14817,14 +14849,14 @@
             <a:noFill/>
           </a:ln>
           <a:extLst>
-            <a:ext uri="{909E8E84-426E-40dd-AFC4-6F175D3DCCD1}">
+            <a:ext uri="{909E8E84-426E-40DD-AFC4-6F175D3DCCD1}">
               <a14:hiddenFill xmlns:a14="http://schemas.microsoft.com/office/drawing/2010/main">
                 <a:solidFill>
                   <a:srgbClr val="FFFFFF"/>
                 </a:solidFill>
               </a14:hiddenFill>
             </a:ext>
-            <a:ext uri="{91240B29-F687-4f45-9708-019B960494DF}">
+            <a:ext uri="{91240B29-F687-4F45-9708-019B960494DF}">
               <a14:hiddenLine xmlns:a14="http://schemas.microsoft.com/office/drawing/2010/main" w="9525">
                 <a:solidFill>
                   <a:srgbClr val="000000"/>
@@ -15028,14 +15060,14 @@
           <a:noFill/>
           <a:ln/>
           <a:extLst>
-            <a:ext uri="{909E8E84-426E-40dd-AFC4-6F175D3DCCD1}">
+            <a:ext uri="{909E8E84-426E-40DD-AFC4-6F175D3DCCD1}">
               <a14:hiddenFill xmlns:a14="http://schemas.microsoft.com/office/drawing/2010/main">
                 <a:solidFill>
                   <a:srgbClr val="FFFFFF"/>
                 </a:solidFill>
               </a14:hiddenFill>
             </a:ext>
-            <a:ext uri="{91240B29-F687-4f45-9708-019B960494DF}">
+            <a:ext uri="{91240B29-F687-4F45-9708-019B960494DF}">
               <a14:hiddenLine xmlns:a14="http://schemas.microsoft.com/office/drawing/2010/main" w="9525">
                 <a:solidFill>
                   <a:srgbClr val="000000"/>
@@ -15143,7 +15175,7 @@
                 <a:latin typeface="Garamond" charset="0"/>
               </a:rPr>
               <a:pPr/>
-              <a:t>9/21/15</a:t>
+              <a:t>9/23/2015</a:t>
             </a:fld>
             <a:endParaRPr lang="en-US" sz="1200">
               <a:latin typeface="Garamond" charset="0"/>
@@ -15165,14 +15197,14 @@
           <a:noFill/>
           <a:ln/>
           <a:extLst>
-            <a:ext uri="{909E8E84-426E-40dd-AFC4-6F175D3DCCD1}">
+            <a:ext uri="{909E8E84-426E-40DD-AFC4-6F175D3DCCD1}">
               <a14:hiddenFill xmlns:a14="http://schemas.microsoft.com/office/drawing/2010/main">
                 <a:solidFill>
                   <a:srgbClr val="FFFFFF"/>
                 </a:solidFill>
               </a14:hiddenFill>
             </a:ext>
-            <a:ext uri="{91240B29-F687-4f45-9708-019B960494DF}">
+            <a:ext uri="{91240B29-F687-4F45-9708-019B960494DF}">
               <a14:hiddenLine xmlns:a14="http://schemas.microsoft.com/office/drawing/2010/main" w="9525">
                 <a:solidFill>
                   <a:srgbClr val="000000"/>
@@ -15334,14 +15366,14 @@
             <a:noFill/>
           </a:ln>
           <a:extLst>
-            <a:ext uri="{909E8E84-426E-40dd-AFC4-6F175D3DCCD1}">
+            <a:ext uri="{909E8E84-426E-40DD-AFC4-6F175D3DCCD1}">
               <a14:hiddenFill xmlns:a14="http://schemas.microsoft.com/office/drawing/2010/main">
                 <a:solidFill>
                   <a:srgbClr val="FFFFFF"/>
                 </a:solidFill>
               </a14:hiddenFill>
             </a:ext>
-            <a:ext uri="{91240B29-F687-4f45-9708-019B960494DF}">
+            <a:ext uri="{91240B29-F687-4F45-9708-019B960494DF}">
               <a14:hiddenLine xmlns:a14="http://schemas.microsoft.com/office/drawing/2010/main" w="9525">
                 <a:solidFill>
                   <a:srgbClr val="000000"/>
@@ -15482,7 +15514,7 @@
   <p:timing>
     <p:tnLst>
       <p:par>
-        <p:cTn xmlns:p14="http://schemas.microsoft.com/office/powerpoint/2010/main" id="1" dur="indefinite" restart="never" nodeType="tmRoot">
+        <p:cTn id="1" dur="indefinite" restart="never" nodeType="tmRoot">
           <p:childTnLst>
             <p:seq concurrent="1" nextAc="seek">
               <p:cTn id="2" dur="indefinite" nodeType="mainSeq">
@@ -15664,14 +15696,14 @@
             <a:noFill/>
           </a:ln>
           <a:extLst>
-            <a:ext uri="{909E8E84-426E-40dd-AFC4-6F175D3DCCD1}">
+            <a:ext uri="{909E8E84-426E-40DD-AFC4-6F175D3DCCD1}">
               <a14:hiddenFill xmlns:a14="http://schemas.microsoft.com/office/drawing/2010/main">
                 <a:solidFill>
                   <a:srgbClr val="FFFFFF"/>
                 </a:solidFill>
               </a14:hiddenFill>
             </a:ext>
-            <a:ext uri="{91240B29-F687-4f45-9708-019B960494DF}">
+            <a:ext uri="{91240B29-F687-4F45-9708-019B960494DF}">
               <a14:hiddenLine xmlns:a14="http://schemas.microsoft.com/office/drawing/2010/main" w="9525">
                 <a:solidFill>
                   <a:srgbClr val="000000"/>
@@ -15867,14 +15899,14 @@
           <a:noFill/>
           <a:ln/>
           <a:extLst>
-            <a:ext uri="{909E8E84-426E-40dd-AFC4-6F175D3DCCD1}">
+            <a:ext uri="{909E8E84-426E-40DD-AFC4-6F175D3DCCD1}">
               <a14:hiddenFill xmlns:a14="http://schemas.microsoft.com/office/drawing/2010/main">
                 <a:solidFill>
                   <a:srgbClr val="FFFFFF"/>
                 </a:solidFill>
               </a14:hiddenFill>
             </a:ext>
-            <a:ext uri="{91240B29-F687-4f45-9708-019B960494DF}">
+            <a:ext uri="{91240B29-F687-4F45-9708-019B960494DF}">
               <a14:hiddenLine xmlns:a14="http://schemas.microsoft.com/office/drawing/2010/main" w="9525">
                 <a:solidFill>
                   <a:srgbClr val="000000"/>
@@ -15982,7 +16014,7 @@
                 <a:latin typeface="Garamond" charset="0"/>
               </a:rPr>
               <a:pPr/>
-              <a:t>9/21/15</a:t>
+              <a:t>9/23/2015</a:t>
             </a:fld>
             <a:endParaRPr lang="en-US" sz="1200">
               <a:latin typeface="Garamond" charset="0"/>
@@ -16004,14 +16036,14 @@
           <a:noFill/>
           <a:ln/>
           <a:extLst>
-            <a:ext uri="{909E8E84-426E-40dd-AFC4-6F175D3DCCD1}">
+            <a:ext uri="{909E8E84-426E-40DD-AFC4-6F175D3DCCD1}">
               <a14:hiddenFill xmlns:a14="http://schemas.microsoft.com/office/drawing/2010/main">
                 <a:solidFill>
                   <a:srgbClr val="FFFFFF"/>
                 </a:solidFill>
               </a14:hiddenFill>
             </a:ext>
-            <a:ext uri="{91240B29-F687-4f45-9708-019B960494DF}">
+            <a:ext uri="{91240B29-F687-4F45-9708-019B960494DF}">
               <a14:hiddenLine xmlns:a14="http://schemas.microsoft.com/office/drawing/2010/main" w="9525">
                 <a:solidFill>
                   <a:srgbClr val="000000"/>
@@ -16173,14 +16205,14 @@
             <a:noFill/>
           </a:ln>
           <a:extLst>
-            <a:ext uri="{909E8E84-426E-40dd-AFC4-6F175D3DCCD1}">
+            <a:ext uri="{909E8E84-426E-40DD-AFC4-6F175D3DCCD1}">
               <a14:hiddenFill xmlns:a14="http://schemas.microsoft.com/office/drawing/2010/main">
                 <a:solidFill>
                   <a:srgbClr val="FFFFFF"/>
                 </a:solidFill>
               </a14:hiddenFill>
             </a:ext>
-            <a:ext uri="{91240B29-F687-4f45-9708-019B960494DF}">
+            <a:ext uri="{91240B29-F687-4F45-9708-019B960494DF}">
               <a14:hiddenLine xmlns:a14="http://schemas.microsoft.com/office/drawing/2010/main" w="9525">
                 <a:solidFill>
                   <a:srgbClr val="000000"/>
@@ -16321,7 +16353,7 @@
   <p:timing>
     <p:tnLst>
       <p:par>
-        <p:cTn xmlns:p14="http://schemas.microsoft.com/office/powerpoint/2010/main" id="1" dur="indefinite" restart="never" nodeType="tmRoot">
+        <p:cTn id="1" dur="indefinite" restart="never" nodeType="tmRoot">
           <p:childTnLst>
             <p:seq concurrent="1" nextAc="seek">
               <p:cTn id="2" dur="indefinite" nodeType="mainSeq">
@@ -17199,14 +17231,14 @@
           <a:noFill/>
           <a:ln/>
           <a:extLst>
-            <a:ext uri="{909E8E84-426E-40dd-AFC4-6F175D3DCCD1}">
+            <a:ext uri="{909E8E84-426E-40DD-AFC4-6F175D3DCCD1}">
               <a14:hiddenFill xmlns:a14="http://schemas.microsoft.com/office/drawing/2010/main">
                 <a:solidFill>
                   <a:srgbClr val="FFFFFF"/>
                 </a:solidFill>
               </a14:hiddenFill>
             </a:ext>
-            <a:ext uri="{91240B29-F687-4f45-9708-019B960494DF}">
+            <a:ext uri="{91240B29-F687-4F45-9708-019B960494DF}">
               <a14:hiddenLine xmlns:a14="http://schemas.microsoft.com/office/drawing/2010/main" w="9525">
                 <a:solidFill>
                   <a:srgbClr val="000000"/>
@@ -17314,7 +17346,7 @@
                 <a:latin typeface="Garamond" charset="0"/>
               </a:rPr>
               <a:pPr/>
-              <a:t>9/21/15</a:t>
+              <a:t>9/23/2015</a:t>
             </a:fld>
             <a:endParaRPr lang="en-US" sz="1200">
               <a:latin typeface="Garamond" charset="0"/>
@@ -17361,14 +17393,14 @@
           <a:noFill/>
           <a:ln/>
           <a:extLst>
-            <a:ext uri="{909E8E84-426E-40dd-AFC4-6F175D3DCCD1}">
+            <a:ext uri="{909E8E84-426E-40DD-AFC4-6F175D3DCCD1}">
               <a14:hiddenFill xmlns:a14="http://schemas.microsoft.com/office/drawing/2010/main">
                 <a:solidFill>
                   <a:srgbClr val="FFFFFF"/>
                 </a:solidFill>
               </a14:hiddenFill>
             </a:ext>
-            <a:ext uri="{91240B29-F687-4f45-9708-019B960494DF}">
+            <a:ext uri="{91240B29-F687-4F45-9708-019B960494DF}">
               <a14:hiddenLine xmlns:a14="http://schemas.microsoft.com/office/drawing/2010/main" w="9525">
                 <a:solidFill>
                   <a:srgbClr val="000000"/>
@@ -17492,7 +17524,7 @@
   <p:timing>
     <p:tnLst>
       <p:par>
-        <p:cTn xmlns:p14="http://schemas.microsoft.com/office/powerpoint/2010/main" id="1" dur="indefinite" restart="never" nodeType="tmRoot"/>
+        <p:cTn id="1" dur="indefinite" restart="never" nodeType="tmRoot"/>
       </p:par>
     </p:tnLst>
   </p:timing>
@@ -17899,14 +17931,14 @@
           <a:noFill/>
           <a:ln/>
           <a:extLst>
-            <a:ext uri="{909E8E84-426E-40dd-AFC4-6F175D3DCCD1}">
+            <a:ext uri="{909E8E84-426E-40DD-AFC4-6F175D3DCCD1}">
               <a14:hiddenFill xmlns:a14="http://schemas.microsoft.com/office/drawing/2010/main">
                 <a:solidFill>
                   <a:srgbClr val="FFFFFF"/>
                 </a:solidFill>
               </a14:hiddenFill>
             </a:ext>
-            <a:ext uri="{91240B29-F687-4f45-9708-019B960494DF}">
+            <a:ext uri="{91240B29-F687-4F45-9708-019B960494DF}">
               <a14:hiddenLine xmlns:a14="http://schemas.microsoft.com/office/drawing/2010/main" w="9525">
                 <a:solidFill>
                   <a:srgbClr val="000000"/>
@@ -18014,7 +18046,7 @@
                 <a:latin typeface="Garamond" charset="0"/>
               </a:rPr>
               <a:pPr/>
-              <a:t>9/21/15</a:t>
+              <a:t>9/23/2015</a:t>
             </a:fld>
             <a:endParaRPr lang="en-US" sz="1200">
               <a:latin typeface="Garamond" charset="0"/>
@@ -18061,14 +18093,14 @@
           <a:noFill/>
           <a:ln/>
           <a:extLst>
-            <a:ext uri="{909E8E84-426E-40dd-AFC4-6F175D3DCCD1}">
+            <a:ext uri="{909E8E84-426E-40DD-AFC4-6F175D3DCCD1}">
               <a14:hiddenFill xmlns:a14="http://schemas.microsoft.com/office/drawing/2010/main">
                 <a:solidFill>
                   <a:srgbClr val="FFFFFF"/>
                 </a:solidFill>
               </a14:hiddenFill>
             </a:ext>
-            <a:ext uri="{91240B29-F687-4f45-9708-019B960494DF}">
+            <a:ext uri="{91240B29-F687-4F45-9708-019B960494DF}">
               <a14:hiddenLine xmlns:a14="http://schemas.microsoft.com/office/drawing/2010/main" w="9525">
                 <a:solidFill>
                   <a:srgbClr val="000000"/>
@@ -18192,7 +18224,7 @@
   <p:timing>
     <p:tnLst>
       <p:par>
-        <p:cTn xmlns:p14="http://schemas.microsoft.com/office/powerpoint/2010/main" id="1" dur="indefinite" restart="never" nodeType="tmRoot"/>
+        <p:cTn id="1" dur="indefinite" restart="never" nodeType="tmRoot"/>
       </p:par>
     </p:tnLst>
   </p:timing>

</xml_diff>